<commit_message>
modified starting engine lecture
</commit_message>
<xml_diff>
--- a/ClassMaterials/Engines/35_Final_Engines.pptx
+++ b/ClassMaterials/Engines/35_Final_Engines.pptx
@@ -5,31 +5,32 @@
     <p:sldMasterId id="2147483648" r:id="rId1"/>
   </p:sldMasterIdLst>
   <p:notesMasterIdLst>
-    <p:notesMasterId r:id="rId21"/>
+    <p:notesMasterId r:id="rId22"/>
   </p:notesMasterIdLst>
   <p:handoutMasterIdLst>
-    <p:handoutMasterId r:id="rId22"/>
+    <p:handoutMasterId r:id="rId23"/>
   </p:handoutMasterIdLst>
   <p:sldIdLst>
     <p:sldId id="304" r:id="rId2"/>
-    <p:sldId id="458" r:id="rId3"/>
-    <p:sldId id="412" r:id="rId4"/>
-    <p:sldId id="457" r:id="rId5"/>
-    <p:sldId id="455" r:id="rId6"/>
-    <p:sldId id="456" r:id="rId7"/>
-    <p:sldId id="330" r:id="rId8"/>
-    <p:sldId id="331" r:id="rId9"/>
-    <p:sldId id="332" r:id="rId10"/>
-    <p:sldId id="333" r:id="rId11"/>
-    <p:sldId id="453" r:id="rId12"/>
-    <p:sldId id="367" r:id="rId13"/>
-    <p:sldId id="366" r:id="rId14"/>
-    <p:sldId id="446" r:id="rId15"/>
-    <p:sldId id="447" r:id="rId16"/>
-    <p:sldId id="335" r:id="rId17"/>
-    <p:sldId id="336" r:id="rId18"/>
-    <p:sldId id="338" r:id="rId19"/>
-    <p:sldId id="339" r:id="rId20"/>
+    <p:sldId id="459" r:id="rId3"/>
+    <p:sldId id="458" r:id="rId4"/>
+    <p:sldId id="412" r:id="rId5"/>
+    <p:sldId id="457" r:id="rId6"/>
+    <p:sldId id="455" r:id="rId7"/>
+    <p:sldId id="456" r:id="rId8"/>
+    <p:sldId id="330" r:id="rId9"/>
+    <p:sldId id="331" r:id="rId10"/>
+    <p:sldId id="332" r:id="rId11"/>
+    <p:sldId id="333" r:id="rId12"/>
+    <p:sldId id="453" r:id="rId13"/>
+    <p:sldId id="367" r:id="rId14"/>
+    <p:sldId id="366" r:id="rId15"/>
+    <p:sldId id="446" r:id="rId16"/>
+    <p:sldId id="447" r:id="rId17"/>
+    <p:sldId id="335" r:id="rId18"/>
+    <p:sldId id="336" r:id="rId19"/>
+    <p:sldId id="338" r:id="rId20"/>
+    <p:sldId id="339" r:id="rId21"/>
   </p:sldIdLst>
   <p:sldSz cx="12192000" cy="6858000"/>
   <p:notesSz cx="7315200" cy="9601200"/>
@@ -175,6 +176,93 @@
     </p:ext>
   </p:extLst>
 </p:presentation>
+</file>
+
+<file path=ppt/changesInfos/changesInfo1.xml><?xml version="1.0" encoding="utf-8"?>
+<pc:chgInfo xmlns:a="http://schemas.openxmlformats.org/drawingml/2006/main" xmlns:r="http://schemas.openxmlformats.org/officeDocument/2006/relationships" xmlns:ac="http://schemas.microsoft.com/office/drawing/2013/main/command" xmlns:pc="http://schemas.microsoft.com/office/powerpoint/2013/main/command">
+  <pc:docChgLst>
+    <pc:chgData name="Hewner, Mike" userId="7f3f83dd-6dfb-4127-a87f-c1714bd4fac9" providerId="ADAL" clId="{14FC7E2B-0F04-4A10-B901-1DBC3B72BF4A}"/>
+    <pc:docChg chg="addSld modSld">
+      <pc:chgData name="Hewner, Mike" userId="7f3f83dd-6dfb-4127-a87f-c1714bd4fac9" providerId="ADAL" clId="{14FC7E2B-0F04-4A10-B901-1DBC3B72BF4A}" dt="2021-11-05T14:48:29.802" v="48" actId="20577"/>
+      <pc:docMkLst>
+        <pc:docMk/>
+      </pc:docMkLst>
+      <pc:sldChg chg="modSp mod">
+        <pc:chgData name="Hewner, Mike" userId="7f3f83dd-6dfb-4127-a87f-c1714bd4fac9" providerId="ADAL" clId="{14FC7E2B-0F04-4A10-B901-1DBC3B72BF4A}" dt="2021-11-05T14:47:17.938" v="1" actId="6549"/>
+        <pc:sldMkLst>
+          <pc:docMk/>
+          <pc:sldMk cId="0" sldId="304"/>
+        </pc:sldMkLst>
+        <pc:spChg chg="mod">
+          <ac:chgData name="Hewner, Mike" userId="7f3f83dd-6dfb-4127-a87f-c1714bd4fac9" providerId="ADAL" clId="{14FC7E2B-0F04-4A10-B901-1DBC3B72BF4A}" dt="2021-11-05T14:47:17.938" v="1" actId="6549"/>
+          <ac:spMkLst>
+            <pc:docMk/>
+            <pc:sldMk cId="0" sldId="304"/>
+            <ac:spMk id="61443" creationId="{00000000-0000-0000-0000-000000000000}"/>
+          </ac:spMkLst>
+        </pc:spChg>
+      </pc:sldChg>
+      <pc:sldChg chg="mod modShow">
+        <pc:chgData name="Hewner, Mike" userId="7f3f83dd-6dfb-4127-a87f-c1714bd4fac9" providerId="ADAL" clId="{14FC7E2B-0F04-4A10-B901-1DBC3B72BF4A}" dt="2021-11-05T14:47:06.394" v="0" actId="729"/>
+        <pc:sldMkLst>
+          <pc:docMk/>
+          <pc:sldMk cId="2789957542" sldId="412"/>
+        </pc:sldMkLst>
+      </pc:sldChg>
+      <pc:sldChg chg="mod modShow">
+        <pc:chgData name="Hewner, Mike" userId="7f3f83dd-6dfb-4127-a87f-c1714bd4fac9" providerId="ADAL" clId="{14FC7E2B-0F04-4A10-B901-1DBC3B72BF4A}" dt="2021-11-05T14:47:06.394" v="0" actId="729"/>
+        <pc:sldMkLst>
+          <pc:docMk/>
+          <pc:sldMk cId="1404268453" sldId="455"/>
+        </pc:sldMkLst>
+      </pc:sldChg>
+      <pc:sldChg chg="mod modShow">
+        <pc:chgData name="Hewner, Mike" userId="7f3f83dd-6dfb-4127-a87f-c1714bd4fac9" providerId="ADAL" clId="{14FC7E2B-0F04-4A10-B901-1DBC3B72BF4A}" dt="2021-11-05T14:47:06.394" v="0" actId="729"/>
+        <pc:sldMkLst>
+          <pc:docMk/>
+          <pc:sldMk cId="3721513751" sldId="456"/>
+        </pc:sldMkLst>
+      </pc:sldChg>
+      <pc:sldChg chg="mod modShow">
+        <pc:chgData name="Hewner, Mike" userId="7f3f83dd-6dfb-4127-a87f-c1714bd4fac9" providerId="ADAL" clId="{14FC7E2B-0F04-4A10-B901-1DBC3B72BF4A}" dt="2021-11-05T14:47:06.394" v="0" actId="729"/>
+        <pc:sldMkLst>
+          <pc:docMk/>
+          <pc:sldMk cId="2670320858" sldId="457"/>
+        </pc:sldMkLst>
+      </pc:sldChg>
+      <pc:sldChg chg="mod modShow">
+        <pc:chgData name="Hewner, Mike" userId="7f3f83dd-6dfb-4127-a87f-c1714bd4fac9" providerId="ADAL" clId="{14FC7E2B-0F04-4A10-B901-1DBC3B72BF4A}" dt="2021-11-05T14:47:06.394" v="0" actId="729"/>
+        <pc:sldMkLst>
+          <pc:docMk/>
+          <pc:sldMk cId="751260803" sldId="458"/>
+        </pc:sldMkLst>
+      </pc:sldChg>
+      <pc:sldChg chg="modSp new mod">
+        <pc:chgData name="Hewner, Mike" userId="7f3f83dd-6dfb-4127-a87f-c1714bd4fac9" providerId="ADAL" clId="{14FC7E2B-0F04-4A10-B901-1DBC3B72BF4A}" dt="2021-11-05T14:48:29.802" v="48" actId="20577"/>
+        <pc:sldMkLst>
+          <pc:docMk/>
+          <pc:sldMk cId="1355269295" sldId="459"/>
+        </pc:sldMkLst>
+        <pc:spChg chg="mod">
+          <ac:chgData name="Hewner, Mike" userId="7f3f83dd-6dfb-4127-a87f-c1714bd4fac9" providerId="ADAL" clId="{14FC7E2B-0F04-4A10-B901-1DBC3B72BF4A}" dt="2021-11-05T14:48:29.802" v="48" actId="20577"/>
+          <ac:spMkLst>
+            <pc:docMk/>
+            <pc:sldMk cId="1355269295" sldId="459"/>
+            <ac:spMk id="2" creationId="{06B1618C-4E9B-45A2-B805-3ED885604A25}"/>
+          </ac:spMkLst>
+        </pc:spChg>
+        <pc:spChg chg="mod">
+          <ac:chgData name="Hewner, Mike" userId="7f3f83dd-6dfb-4127-a87f-c1714bd4fac9" providerId="ADAL" clId="{14FC7E2B-0F04-4A10-B901-1DBC3B72BF4A}" dt="2021-11-05T14:47:55.656" v="4"/>
+          <ac:spMkLst>
+            <pc:docMk/>
+            <pc:sldMk cId="1355269295" sldId="459"/>
+            <ac:spMk id="3" creationId="{576371E3-F8F5-49C0-B187-07C29BCA2BA3}"/>
+          </ac:spMkLst>
+        </pc:spChg>
+      </pc:sldChg>
+    </pc:docChg>
+  </pc:docChgLst>
+</pc:chgInfo>
 </file>
 
 <file path=ppt/handoutMasters/handoutMaster1.xml><?xml version="1.0" encoding="utf-8"?>
@@ -1001,7 +1089,7 @@
             <a:fld id="{76265C54-799C-4F9B-B21B-5E9FC6A82654}" type="slidenum">
               <a:rPr lang="en-US" smtClean="0"/>
               <a:pPr/>
-              <a:t>6</a:t>
+              <a:t>7</a:t>
             </a:fld>
             <a:endParaRPr lang="en-US"/>
           </a:p>
@@ -1057,7 +1145,7 @@
             <a:fld id="{27E7E1B6-3FB4-4DF8-9A15-D0ECDAE2F8F0}" type="slidenum">
               <a:rPr lang="en-US"/>
               <a:pPr/>
-              <a:t>9</a:t>
+              <a:t>10</a:t>
             </a:fld>
             <a:endParaRPr lang="en-US"/>
           </a:p>
@@ -1203,7 +1291,7 @@
             <a:fld id="{76265C54-799C-4F9B-B21B-5E9FC6A82654}" type="slidenum">
               <a:rPr lang="en-US" smtClean="0"/>
               <a:pPr/>
-              <a:t>10</a:t>
+              <a:t>11</a:t>
             </a:fld>
             <a:endParaRPr lang="en-US"/>
           </a:p>
@@ -1298,7 +1386,7 @@
             <a:fld id="{76265C54-799C-4F9B-B21B-5E9FC6A82654}" type="slidenum">
               <a:rPr lang="en-US" smtClean="0"/>
               <a:pPr/>
-              <a:t>13</a:t>
+              <a:t>14</a:t>
             </a:fld>
             <a:endParaRPr lang="en-US"/>
           </a:p>
@@ -1383,7 +1471,7 @@
             <a:fld id="{76265C54-799C-4F9B-B21B-5E9FC6A82654}" type="slidenum">
               <a:rPr lang="en-US" smtClean="0"/>
               <a:pPr/>
-              <a:t>17</a:t>
+              <a:t>18</a:t>
             </a:fld>
             <a:endParaRPr lang="en-US"/>
           </a:p>
@@ -3571,20 +3659,6 @@
             <a:pPr algn="r"/>
             <a:r>
               <a:rPr lang="en-US" dirty="0"/>
-              <a:t>Ref Params Hint</a:t>
-            </a:r>
-          </a:p>
-          <a:p>
-            <a:pPr algn="r"/>
-            <a:r>
-              <a:rPr lang="en-US" dirty="0"/>
-              <a:t>Final Exam</a:t>
-            </a:r>
-          </a:p>
-          <a:p>
-            <a:pPr algn="r"/>
-            <a:r>
-              <a:rPr lang="en-US" dirty="0"/>
               <a:t>Engines</a:t>
             </a:r>
           </a:p>
@@ -3647,6 +3721,486 @@
 </file>
 
 <file path=ppt/slides/slide10.xml><?xml version="1.0" encoding="utf-8"?>
+<p:sld xmlns:a="http://schemas.openxmlformats.org/drawingml/2006/main" xmlns:r="http://schemas.openxmlformats.org/officeDocument/2006/relationships" xmlns:p="http://schemas.openxmlformats.org/presentationml/2006/main" showMasterPhAnim="0">
+  <p:cSld>
+    <p:spTree>
+      <p:nvGrpSpPr>
+        <p:cNvPr id="1" name=""/>
+        <p:cNvGrpSpPr/>
+        <p:nvPr/>
+      </p:nvGrpSpPr>
+      <p:grpSpPr>
+        <a:xfrm>
+          <a:off x="0" y="0"/>
+          <a:ext cx="0" cy="0"/>
+          <a:chOff x="0" y="0"/>
+          <a:chExt cx="0" cy="0"/>
+        </a:xfrm>
+      </p:grpSpPr>
+      <p:sp>
+        <p:nvSpPr>
+          <p:cNvPr id="80898" name="Rectangle 2"/>
+          <p:cNvSpPr>
+            <a:spLocks noGrp="1" noChangeArrowheads="1"/>
+          </p:cNvSpPr>
+          <p:nvPr>
+            <p:ph type="title"/>
+          </p:nvPr>
+        </p:nvSpPr>
+        <p:spPr>
+          <a:xfrm>
+            <a:off x="2471739" y="1"/>
+            <a:ext cx="5737225" cy="930275"/>
+          </a:xfrm>
+        </p:spPr>
+        <p:txBody>
+          <a:bodyPr/>
+          <a:lstStyle/>
+          <a:p>
+            <a:r>
+              <a:rPr lang="en-US" sz="4000" dirty="0"/>
+              <a:t>How Engines work 2</a:t>
+            </a:r>
+          </a:p>
+        </p:txBody>
+      </p:sp>
+      <p:sp>
+        <p:nvSpPr>
+          <p:cNvPr id="80899" name="Rectangle 3"/>
+          <p:cNvSpPr>
+            <a:spLocks noGrp="1" noChangeArrowheads="1"/>
+          </p:cNvSpPr>
+          <p:nvPr>
+            <p:ph type="body" idx="1"/>
+          </p:nvPr>
+        </p:nvSpPr>
+        <p:spPr>
+          <a:xfrm>
+            <a:off x="1524000" y="914400"/>
+            <a:ext cx="8909050" cy="5410200"/>
+          </a:xfrm>
+        </p:spPr>
+        <p:txBody>
+          <a:bodyPr/>
+          <a:lstStyle/>
+          <a:p>
+            <a:pPr>
+              <a:lnSpc>
+                <a:spcPct val="90000"/>
+              </a:lnSpc>
+            </a:pPr>
+            <a:r>
+              <a:rPr lang="en-US" sz="2800" dirty="0"/>
+              <a:t>The three arguments passed  to an engine are:</a:t>
+            </a:r>
+          </a:p>
+          <a:p>
+            <a:pPr>
+              <a:lnSpc>
+                <a:spcPct val="90000"/>
+              </a:lnSpc>
+            </a:pPr>
+            <a:r>
+              <a:rPr lang="en-US" sz="2800" dirty="0">
+                <a:solidFill>
+                  <a:srgbClr val="FF0000"/>
+                </a:solidFill>
+              </a:rPr>
+              <a:t>ticks:</a:t>
+            </a:r>
+            <a:r>
+              <a:rPr lang="en-US" sz="2800" dirty="0"/>
+              <a:t>   a positive integer specifying the amount of "fuel" given to the engine.</a:t>
+            </a:r>
+          </a:p>
+          <a:p>
+            <a:pPr>
+              <a:lnSpc>
+                <a:spcPct val="90000"/>
+              </a:lnSpc>
+            </a:pPr>
+            <a:r>
+              <a:rPr lang="en-US" sz="2800" dirty="0">
+                <a:solidFill>
+                  <a:srgbClr val="FF0000"/>
+                </a:solidFill>
+              </a:rPr>
+              <a:t>complete:</a:t>
+            </a:r>
+            <a:r>
+              <a:rPr lang="en-US" sz="2800" dirty="0"/>
+              <a:t>  a procedure that specifies what to do if the evaluation of </a:t>
+            </a:r>
+            <a:r>
+              <a:rPr lang="en-US" sz="2800" dirty="0">
+                <a:latin typeface="Courier New" pitchFamily="49" charset="0"/>
+              </a:rPr>
+              <a:t>thunk</a:t>
+            </a:r>
+            <a:r>
+              <a:rPr lang="en-US" sz="2800" dirty="0"/>
+              <a:t> finishes before the fuel expires.  </a:t>
+            </a:r>
+          </a:p>
+          <a:p>
+            <a:pPr lvl="1">
+              <a:lnSpc>
+                <a:spcPct val="90000"/>
+              </a:lnSpc>
+            </a:pPr>
+            <a:r>
+              <a:rPr lang="en-US" dirty="0">
+                <a:latin typeface="Courier New" pitchFamily="49" charset="0"/>
+              </a:rPr>
+              <a:t>complete</a:t>
+            </a:r>
+            <a:r>
+              <a:rPr lang="en-US" dirty="0"/>
+              <a:t> is a procedure of two arguments: amount of fuel "left over" and the result of the computation.</a:t>
+            </a:r>
+          </a:p>
+          <a:p>
+            <a:pPr>
+              <a:lnSpc>
+                <a:spcPct val="90000"/>
+              </a:lnSpc>
+            </a:pPr>
+            <a:r>
+              <a:rPr lang="en-US" sz="2800" dirty="0">
+                <a:solidFill>
+                  <a:srgbClr val="FF0000"/>
+                </a:solidFill>
+              </a:rPr>
+              <a:t>expire:</a:t>
+            </a:r>
+            <a:r>
+              <a:rPr lang="en-US" sz="2800" dirty="0"/>
+              <a:t>  a one-argument procedure to be executed if the computation runs out of fuel before it completes.  </a:t>
+            </a:r>
+          </a:p>
+          <a:p>
+            <a:pPr lvl="1">
+              <a:lnSpc>
+                <a:spcPct val="90000"/>
+              </a:lnSpc>
+            </a:pPr>
+            <a:r>
+              <a:rPr lang="en-US" dirty="0"/>
+              <a:t>The argument that will be passed to </a:t>
+            </a:r>
+            <a:r>
+              <a:rPr lang="en-US" dirty="0">
+                <a:latin typeface="Courier New" pitchFamily="49" charset="0"/>
+              </a:rPr>
+              <a:t>expire</a:t>
+            </a:r>
+            <a:r>
+              <a:rPr lang="en-US" dirty="0"/>
+              <a:t> is a new engine that can finish the computation from where it left off.</a:t>
+            </a:r>
+          </a:p>
+        </p:txBody>
+      </p:sp>
+    </p:spTree>
+  </p:cSld>
+  <p:clrMapOvr>
+    <a:masterClrMapping/>
+  </p:clrMapOvr>
+  <p:timing>
+    <p:tnLst>
+      <p:par>
+        <p:cTn id="1" dur="indefinite" restart="never" nodeType="tmRoot">
+          <p:childTnLst>
+            <p:seq concurrent="1" nextAc="seek">
+              <p:cTn id="2" dur="indefinite" nodeType="mainSeq">
+                <p:childTnLst>
+                  <p:par>
+                    <p:cTn id="3" fill="hold">
+                      <p:stCondLst>
+                        <p:cond delay="indefinite"/>
+                      </p:stCondLst>
+                      <p:childTnLst>
+                        <p:par>
+                          <p:cTn id="4" fill="hold">
+                            <p:stCondLst>
+                              <p:cond delay="0"/>
+                            </p:stCondLst>
+                            <p:childTnLst>
+                              <p:par>
+                                <p:cTn id="5" presetID="1" presetClass="entr" presetSubtype="0" fill="hold" grpId="0" nodeType="clickEffect">
+                                  <p:stCondLst>
+                                    <p:cond delay="0"/>
+                                  </p:stCondLst>
+                                  <p:childTnLst>
+                                    <p:set>
+                                      <p:cBhvr>
+                                        <p:cTn id="6" dur="1" fill="hold">
+                                          <p:stCondLst>
+                                            <p:cond delay="0"/>
+                                          </p:stCondLst>
+                                        </p:cTn>
+                                        <p:tgtEl>
+                                          <p:spTgt spid="80899">
+                                            <p:txEl>
+                                              <p:pRg st="0" end="0"/>
+                                            </p:txEl>
+                                          </p:spTgt>
+                                        </p:tgtEl>
+                                        <p:attrNameLst>
+                                          <p:attrName>style.visibility</p:attrName>
+                                        </p:attrNameLst>
+                                      </p:cBhvr>
+                                      <p:to>
+                                        <p:strVal val="visible"/>
+                                      </p:to>
+                                    </p:set>
+                                  </p:childTnLst>
+                                </p:cTn>
+                              </p:par>
+                            </p:childTnLst>
+                          </p:cTn>
+                        </p:par>
+                      </p:childTnLst>
+                    </p:cTn>
+                  </p:par>
+                  <p:par>
+                    <p:cTn id="7" fill="hold">
+                      <p:stCondLst>
+                        <p:cond delay="indefinite"/>
+                      </p:stCondLst>
+                      <p:childTnLst>
+                        <p:par>
+                          <p:cTn id="8" fill="hold">
+                            <p:stCondLst>
+                              <p:cond delay="0"/>
+                            </p:stCondLst>
+                            <p:childTnLst>
+                              <p:par>
+                                <p:cTn id="9" presetID="1" presetClass="entr" presetSubtype="0" fill="hold" grpId="0" nodeType="clickEffect">
+                                  <p:stCondLst>
+                                    <p:cond delay="0"/>
+                                  </p:stCondLst>
+                                  <p:childTnLst>
+                                    <p:set>
+                                      <p:cBhvr>
+                                        <p:cTn id="10" dur="1" fill="hold">
+                                          <p:stCondLst>
+                                            <p:cond delay="0"/>
+                                          </p:stCondLst>
+                                        </p:cTn>
+                                        <p:tgtEl>
+                                          <p:spTgt spid="80899">
+                                            <p:txEl>
+                                              <p:pRg st="1" end="1"/>
+                                            </p:txEl>
+                                          </p:spTgt>
+                                        </p:tgtEl>
+                                        <p:attrNameLst>
+                                          <p:attrName>style.visibility</p:attrName>
+                                        </p:attrNameLst>
+                                      </p:cBhvr>
+                                      <p:to>
+                                        <p:strVal val="visible"/>
+                                      </p:to>
+                                    </p:set>
+                                  </p:childTnLst>
+                                </p:cTn>
+                              </p:par>
+                            </p:childTnLst>
+                          </p:cTn>
+                        </p:par>
+                      </p:childTnLst>
+                    </p:cTn>
+                  </p:par>
+                  <p:par>
+                    <p:cTn id="11" fill="hold">
+                      <p:stCondLst>
+                        <p:cond delay="indefinite"/>
+                      </p:stCondLst>
+                      <p:childTnLst>
+                        <p:par>
+                          <p:cTn id="12" fill="hold">
+                            <p:stCondLst>
+                              <p:cond delay="0"/>
+                            </p:stCondLst>
+                            <p:childTnLst>
+                              <p:par>
+                                <p:cTn id="13" presetID="1" presetClass="entr" presetSubtype="0" fill="hold" grpId="0" nodeType="clickEffect">
+                                  <p:stCondLst>
+                                    <p:cond delay="0"/>
+                                  </p:stCondLst>
+                                  <p:childTnLst>
+                                    <p:set>
+                                      <p:cBhvr>
+                                        <p:cTn id="14" dur="1" fill="hold">
+                                          <p:stCondLst>
+                                            <p:cond delay="0"/>
+                                          </p:stCondLst>
+                                        </p:cTn>
+                                        <p:tgtEl>
+                                          <p:spTgt spid="80899">
+                                            <p:txEl>
+                                              <p:pRg st="2" end="2"/>
+                                            </p:txEl>
+                                          </p:spTgt>
+                                        </p:tgtEl>
+                                        <p:attrNameLst>
+                                          <p:attrName>style.visibility</p:attrName>
+                                        </p:attrNameLst>
+                                      </p:cBhvr>
+                                      <p:to>
+                                        <p:strVal val="visible"/>
+                                      </p:to>
+                                    </p:set>
+                                  </p:childTnLst>
+                                </p:cTn>
+                              </p:par>
+                              <p:par>
+                                <p:cTn id="15" presetID="1" presetClass="entr" presetSubtype="0" fill="hold" grpId="0" nodeType="withEffect">
+                                  <p:stCondLst>
+                                    <p:cond delay="0"/>
+                                  </p:stCondLst>
+                                  <p:childTnLst>
+                                    <p:set>
+                                      <p:cBhvr>
+                                        <p:cTn id="16" dur="1" fill="hold">
+                                          <p:stCondLst>
+                                            <p:cond delay="0"/>
+                                          </p:stCondLst>
+                                        </p:cTn>
+                                        <p:tgtEl>
+                                          <p:spTgt spid="80899">
+                                            <p:txEl>
+                                              <p:pRg st="3" end="3"/>
+                                            </p:txEl>
+                                          </p:spTgt>
+                                        </p:tgtEl>
+                                        <p:attrNameLst>
+                                          <p:attrName>style.visibility</p:attrName>
+                                        </p:attrNameLst>
+                                      </p:cBhvr>
+                                      <p:to>
+                                        <p:strVal val="visible"/>
+                                      </p:to>
+                                    </p:set>
+                                  </p:childTnLst>
+                                </p:cTn>
+                              </p:par>
+                            </p:childTnLst>
+                          </p:cTn>
+                        </p:par>
+                      </p:childTnLst>
+                    </p:cTn>
+                  </p:par>
+                  <p:par>
+                    <p:cTn id="17" fill="hold">
+                      <p:stCondLst>
+                        <p:cond delay="indefinite"/>
+                      </p:stCondLst>
+                      <p:childTnLst>
+                        <p:par>
+                          <p:cTn id="18" fill="hold">
+                            <p:stCondLst>
+                              <p:cond delay="0"/>
+                            </p:stCondLst>
+                            <p:childTnLst>
+                              <p:par>
+                                <p:cTn id="19" presetID="1" presetClass="entr" presetSubtype="0" fill="hold" grpId="0" nodeType="clickEffect">
+                                  <p:stCondLst>
+                                    <p:cond delay="0"/>
+                                  </p:stCondLst>
+                                  <p:childTnLst>
+                                    <p:set>
+                                      <p:cBhvr>
+                                        <p:cTn id="20" dur="1" fill="hold">
+                                          <p:stCondLst>
+                                            <p:cond delay="0"/>
+                                          </p:stCondLst>
+                                        </p:cTn>
+                                        <p:tgtEl>
+                                          <p:spTgt spid="80899">
+                                            <p:txEl>
+                                              <p:pRg st="4" end="4"/>
+                                            </p:txEl>
+                                          </p:spTgt>
+                                        </p:tgtEl>
+                                        <p:attrNameLst>
+                                          <p:attrName>style.visibility</p:attrName>
+                                        </p:attrNameLst>
+                                      </p:cBhvr>
+                                      <p:to>
+                                        <p:strVal val="visible"/>
+                                      </p:to>
+                                    </p:set>
+                                  </p:childTnLst>
+                                </p:cTn>
+                              </p:par>
+                              <p:par>
+                                <p:cTn id="21" presetID="1" presetClass="entr" presetSubtype="0" fill="hold" grpId="0" nodeType="withEffect">
+                                  <p:stCondLst>
+                                    <p:cond delay="0"/>
+                                  </p:stCondLst>
+                                  <p:childTnLst>
+                                    <p:set>
+                                      <p:cBhvr>
+                                        <p:cTn id="22" dur="1" fill="hold">
+                                          <p:stCondLst>
+                                            <p:cond delay="0"/>
+                                          </p:stCondLst>
+                                        </p:cTn>
+                                        <p:tgtEl>
+                                          <p:spTgt spid="80899">
+                                            <p:txEl>
+                                              <p:pRg st="5" end="5"/>
+                                            </p:txEl>
+                                          </p:spTgt>
+                                        </p:tgtEl>
+                                        <p:attrNameLst>
+                                          <p:attrName>style.visibility</p:attrName>
+                                        </p:attrNameLst>
+                                      </p:cBhvr>
+                                      <p:to>
+                                        <p:strVal val="visible"/>
+                                      </p:to>
+                                    </p:set>
+                                  </p:childTnLst>
+                                </p:cTn>
+                              </p:par>
+                            </p:childTnLst>
+                          </p:cTn>
+                        </p:par>
+                      </p:childTnLst>
+                    </p:cTn>
+                  </p:par>
+                </p:childTnLst>
+              </p:cTn>
+              <p:prevCondLst>
+                <p:cond evt="onPrev" delay="0">
+                  <p:tgtEl>
+                    <p:sldTgt/>
+                  </p:tgtEl>
+                </p:cond>
+              </p:prevCondLst>
+              <p:nextCondLst>
+                <p:cond evt="onNext" delay="0">
+                  <p:tgtEl>
+                    <p:sldTgt/>
+                  </p:tgtEl>
+                </p:cond>
+              </p:nextCondLst>
+            </p:seq>
+          </p:childTnLst>
+        </p:cTn>
+      </p:par>
+    </p:tnLst>
+    <p:bldLst>
+      <p:bldP spid="80899" grpId="0" build="p"/>
+    </p:bldLst>
+  </p:timing>
+</p:sld>
+</file>
+
+<file path=ppt/slides/slide11.xml><?xml version="1.0" encoding="utf-8"?>
 <p:sld xmlns:a="http://schemas.openxmlformats.org/drawingml/2006/main" xmlns:r="http://schemas.openxmlformats.org/officeDocument/2006/relationships" xmlns:p="http://schemas.openxmlformats.org/presentationml/2006/main" showMasterPhAnim="0">
   <p:cSld>
     <p:spTree>
@@ -4973,7 +5527,7 @@
 </p:sld>
 </file>
 
-<file path=ppt/slides/slide11.xml><?xml version="1.0" encoding="utf-8"?>
+<file path=ppt/slides/slide12.xml><?xml version="1.0" encoding="utf-8"?>
 <p:sld xmlns:a="http://schemas.openxmlformats.org/drawingml/2006/main" xmlns:r="http://schemas.openxmlformats.org/officeDocument/2006/relationships" xmlns:p="http://schemas.openxmlformats.org/presentationml/2006/main">
   <p:cSld>
     <p:spTree>
@@ -5392,7 +5946,7 @@
 </p:sld>
 </file>
 
-<file path=ppt/slides/slide12.xml><?xml version="1.0" encoding="utf-8"?>
+<file path=ppt/slides/slide13.xml><?xml version="1.0" encoding="utf-8"?>
 <p:sld xmlns:a="http://schemas.openxmlformats.org/drawingml/2006/main" xmlns:r="http://schemas.openxmlformats.org/officeDocument/2006/relationships" xmlns:p="http://schemas.openxmlformats.org/presentationml/2006/main" show="0">
   <p:cSld>
     <p:spTree>
@@ -5532,7 +6086,7 @@
 </p:sld>
 </file>
 
-<file path=ppt/slides/slide13.xml><?xml version="1.0" encoding="utf-8"?>
+<file path=ppt/slides/slide14.xml><?xml version="1.0" encoding="utf-8"?>
 <p:sld xmlns:a="http://schemas.openxmlformats.org/drawingml/2006/main" xmlns:r="http://schemas.openxmlformats.org/officeDocument/2006/relationships" xmlns:p="http://schemas.openxmlformats.org/presentationml/2006/main" showMasterPhAnim="0">
   <p:cSld>
     <p:spTree>
@@ -7142,7 +7696,7 @@
 </p:sld>
 </file>
 
-<file path=ppt/slides/slide14.xml><?xml version="1.0" encoding="utf-8"?>
+<file path=ppt/slides/slide15.xml><?xml version="1.0" encoding="utf-8"?>
 <p:sld xmlns:a="http://schemas.openxmlformats.org/drawingml/2006/main" xmlns:r="http://schemas.openxmlformats.org/officeDocument/2006/relationships" xmlns:p="http://schemas.openxmlformats.org/presentationml/2006/main">
   <p:cSld>
     <p:spTree>
@@ -7235,7 +7789,7 @@
 </p:sld>
 </file>
 
-<file path=ppt/slides/slide15.xml><?xml version="1.0" encoding="utf-8"?>
+<file path=ppt/slides/slide16.xml><?xml version="1.0" encoding="utf-8"?>
 <p:sld xmlns:a="http://schemas.openxmlformats.org/drawingml/2006/main" xmlns:r="http://schemas.openxmlformats.org/officeDocument/2006/relationships" xmlns:p="http://schemas.openxmlformats.org/presentationml/2006/main">
   <p:cSld>
     <p:spTree>
@@ -7436,7 +7990,7 @@
 </p:sld>
 </file>
 
-<file path=ppt/slides/slide16.xml><?xml version="1.0" encoding="utf-8"?>
+<file path=ppt/slides/slide17.xml><?xml version="1.0" encoding="utf-8"?>
 <p:sld xmlns:a="http://schemas.openxmlformats.org/drawingml/2006/main" xmlns:r="http://schemas.openxmlformats.org/officeDocument/2006/relationships" xmlns:p="http://schemas.openxmlformats.org/presentationml/2006/main">
   <p:cSld>
     <p:spTree>
@@ -7505,7 +8059,7 @@
 </p:sld>
 </file>
 
-<file path=ppt/slides/slide17.xml><?xml version="1.0" encoding="utf-8"?>
+<file path=ppt/slides/slide18.xml><?xml version="1.0" encoding="utf-8"?>
 <p:sld xmlns:a="http://schemas.openxmlformats.org/drawingml/2006/main" xmlns:r="http://schemas.openxmlformats.org/officeDocument/2006/relationships" xmlns:p="http://schemas.openxmlformats.org/presentationml/2006/main">
   <p:cSld>
     <p:spTree>
@@ -8209,7 +8763,7 @@
 </p:sld>
 </file>
 
-<file path=ppt/slides/slide18.xml><?xml version="1.0" encoding="utf-8"?>
+<file path=ppt/slides/slide19.xml><?xml version="1.0" encoding="utf-8"?>
 <p:sld xmlns:a="http://schemas.openxmlformats.org/drawingml/2006/main" xmlns:r="http://schemas.openxmlformats.org/officeDocument/2006/relationships" xmlns:p="http://schemas.openxmlformats.org/presentationml/2006/main">
   <p:cSld>
     <p:spTree>
@@ -8481,7 +9035,164 @@
 </p:sld>
 </file>
 
-<file path=ppt/slides/slide19.xml><?xml version="1.0" encoding="utf-8"?>
+<file path=ppt/slides/slide2.xml><?xml version="1.0" encoding="utf-8"?>
+<p:sld xmlns:a="http://schemas.openxmlformats.org/drawingml/2006/main" xmlns:r="http://schemas.openxmlformats.org/officeDocument/2006/relationships" xmlns:p="http://schemas.openxmlformats.org/presentationml/2006/main">
+  <p:cSld>
+    <p:spTree>
+      <p:nvGrpSpPr>
+        <p:cNvPr id="1" name=""/>
+        <p:cNvGrpSpPr/>
+        <p:nvPr/>
+      </p:nvGrpSpPr>
+      <p:grpSpPr>
+        <a:xfrm>
+          <a:off x="0" y="0"/>
+          <a:ext cx="0" cy="0"/>
+          <a:chOff x="0" y="0"/>
+          <a:chExt cx="0" cy="0"/>
+        </a:xfrm>
+      </p:grpSpPr>
+      <p:sp>
+        <p:nvSpPr>
+          <p:cNvPr id="2" name="Title 1">
+            <a:extLst>
+              <a:ext uri="{FF2B5EF4-FFF2-40B4-BE49-F238E27FC236}">
+                <a16:creationId xmlns:a16="http://schemas.microsoft.com/office/drawing/2014/main" id="{06B1618C-4E9B-45A2-B805-3ED885604A25}"/>
+              </a:ext>
+            </a:extLst>
+          </p:cNvPr>
+          <p:cNvSpPr>
+            <a:spLocks noGrp="1"/>
+          </p:cNvSpPr>
+          <p:nvPr>
+            <p:ph type="title"/>
+          </p:nvPr>
+        </p:nvSpPr>
+        <p:spPr/>
+        <p:txBody>
+          <a:bodyPr/>
+          <a:lstStyle/>
+          <a:p>
+            <a:r>
+              <a:rPr lang="en-US" dirty="0"/>
+              <a:t>How can we implement this? (hint: call/cc)</a:t>
+            </a:r>
+          </a:p>
+        </p:txBody>
+      </p:sp>
+      <p:sp>
+        <p:nvSpPr>
+          <p:cNvPr id="3" name="Content Placeholder 2">
+            <a:extLst>
+              <a:ext uri="{FF2B5EF4-FFF2-40B4-BE49-F238E27FC236}">
+                <a16:creationId xmlns:a16="http://schemas.microsoft.com/office/drawing/2014/main" id="{576371E3-F8F5-49C0-B187-07C29BCA2BA3}"/>
+              </a:ext>
+            </a:extLst>
+          </p:cNvPr>
+          <p:cNvSpPr>
+            <a:spLocks noGrp="1"/>
+          </p:cNvSpPr>
+          <p:nvPr>
+            <p:ph idx="1"/>
+          </p:nvPr>
+        </p:nvSpPr>
+        <p:spPr/>
+        <p:txBody>
+          <a:bodyPr/>
+          <a:lstStyle/>
+          <a:p>
+            <a:pPr marL="0" indent="0">
+              <a:buNone/>
+            </a:pPr>
+            <a:r>
+              <a:rPr lang="en-US" dirty="0"/>
+              <a:t>(run-</a:t>
+            </a:r>
+            <a:r>
+              <a:rPr lang="en-US" dirty="0" err="1"/>
+              <a:t>pausable</a:t>
+            </a:r>
+            <a:r>
+              <a:rPr lang="en-US" dirty="0"/>
+              <a:t> (lambda (pause-me)</a:t>
+            </a:r>
+          </a:p>
+          <a:p>
+            <a:pPr marL="0" indent="0">
+              <a:buNone/>
+            </a:pPr>
+            <a:r>
+              <a:rPr lang="en-US" dirty="0"/>
+              <a:t>                (display "1")</a:t>
+            </a:r>
+          </a:p>
+          <a:p>
+            <a:pPr marL="0" indent="0">
+              <a:buNone/>
+            </a:pPr>
+            <a:r>
+              <a:rPr lang="en-US" dirty="0"/>
+              <a:t>                (newline)</a:t>
+            </a:r>
+          </a:p>
+          <a:p>
+            <a:pPr marL="0" indent="0">
+              <a:buNone/>
+            </a:pPr>
+            <a:r>
+              <a:rPr lang="en-US" dirty="0"/>
+              <a:t>                (pause-me)</a:t>
+            </a:r>
+          </a:p>
+          <a:p>
+            <a:pPr marL="0" indent="0">
+              <a:buNone/>
+            </a:pPr>
+            <a:r>
+              <a:rPr lang="en-US" dirty="0"/>
+              <a:t>                (display "2")</a:t>
+            </a:r>
+          </a:p>
+          <a:p>
+            <a:pPr marL="0" indent="0">
+              <a:buNone/>
+            </a:pPr>
+            <a:r>
+              <a:rPr lang="en-US" dirty="0"/>
+              <a:t>                (newline)</a:t>
+            </a:r>
+          </a:p>
+          <a:p>
+            <a:pPr marL="0" indent="0">
+              <a:buNone/>
+            </a:pPr>
+            <a:r>
+              <a:rPr lang="en-US" dirty="0"/>
+              <a:t>                (display "3")))</a:t>
+            </a:r>
+          </a:p>
+          <a:p>
+            <a:pPr marL="0" indent="0">
+              <a:buNone/>
+            </a:pPr>
+            <a:endParaRPr lang="en-US" dirty="0"/>
+          </a:p>
+        </p:txBody>
+      </p:sp>
+    </p:spTree>
+    <p:extLst>
+      <p:ext uri="{BB962C8B-B14F-4D97-AF65-F5344CB8AC3E}">
+        <p14:creationId xmlns:p14="http://schemas.microsoft.com/office/powerpoint/2010/main" val="1355269295"/>
+      </p:ext>
+    </p:extLst>
+  </p:cSld>
+  <p:clrMapOvr>
+    <a:masterClrMapping/>
+  </p:clrMapOvr>
+</p:sld>
+</file>
+
+<file path=ppt/slides/slide20.xml><?xml version="1.0" encoding="utf-8"?>
 <p:sld xmlns:a="http://schemas.openxmlformats.org/drawingml/2006/main" xmlns:r="http://schemas.openxmlformats.org/officeDocument/2006/relationships" xmlns:p="http://schemas.openxmlformats.org/presentationml/2006/main">
   <p:cSld>
     <p:spTree>
@@ -8674,8 +9385,8 @@
 </p:sld>
 </file>
 
-<file path=ppt/slides/slide2.xml><?xml version="1.0" encoding="utf-8"?>
-<p:sld xmlns:a="http://schemas.openxmlformats.org/drawingml/2006/main" xmlns:r="http://schemas.openxmlformats.org/officeDocument/2006/relationships" xmlns:p="http://schemas.openxmlformats.org/presentationml/2006/main">
+<file path=ppt/slides/slide3.xml><?xml version="1.0" encoding="utf-8"?>
+<p:sld xmlns:a="http://schemas.openxmlformats.org/drawingml/2006/main" xmlns:r="http://schemas.openxmlformats.org/officeDocument/2006/relationships" xmlns:p="http://schemas.openxmlformats.org/presentationml/2006/main" show="0">
   <p:cSld>
     <p:spTree>
       <p:nvGrpSpPr>
@@ -8904,8 +9615,8 @@
 </p:sld>
 </file>
 
-<file path=ppt/slides/slide3.xml><?xml version="1.0" encoding="utf-8"?>
-<p:sld xmlns:a="http://schemas.openxmlformats.org/drawingml/2006/main" xmlns:r="http://schemas.openxmlformats.org/officeDocument/2006/relationships" xmlns:p="http://schemas.openxmlformats.org/presentationml/2006/main">
+<file path=ppt/slides/slide4.xml><?xml version="1.0" encoding="utf-8"?>
+<p:sld xmlns:a="http://schemas.openxmlformats.org/drawingml/2006/main" xmlns:r="http://schemas.openxmlformats.org/officeDocument/2006/relationships" xmlns:p="http://schemas.openxmlformats.org/presentationml/2006/main" show="0">
   <p:cSld>
     <p:spTree>
       <p:nvGrpSpPr>
@@ -9045,8 +9756,8 @@
 </p:sld>
 </file>
 
-<file path=ppt/slides/slide4.xml><?xml version="1.0" encoding="utf-8"?>
-<p:sld xmlns:a="http://schemas.openxmlformats.org/drawingml/2006/main" xmlns:r="http://schemas.openxmlformats.org/officeDocument/2006/relationships" xmlns:p="http://schemas.openxmlformats.org/presentationml/2006/main">
+<file path=ppt/slides/slide5.xml><?xml version="1.0" encoding="utf-8"?>
+<p:sld xmlns:a="http://schemas.openxmlformats.org/drawingml/2006/main" xmlns:r="http://schemas.openxmlformats.org/officeDocument/2006/relationships" xmlns:p="http://schemas.openxmlformats.org/presentationml/2006/main" show="0">
   <p:cSld>
     <p:spTree>
       <p:nvGrpSpPr>
@@ -9186,8 +9897,8 @@
 </p:sld>
 </file>
 
-<file path=ppt/slides/slide5.xml><?xml version="1.0" encoding="utf-8"?>
-<p:sld xmlns:a="http://schemas.openxmlformats.org/drawingml/2006/main" xmlns:r="http://schemas.openxmlformats.org/officeDocument/2006/relationships" xmlns:p="http://schemas.openxmlformats.org/presentationml/2006/main">
+<file path=ppt/slides/slide6.xml><?xml version="1.0" encoding="utf-8"?>
+<p:sld xmlns:a="http://schemas.openxmlformats.org/drawingml/2006/main" xmlns:r="http://schemas.openxmlformats.org/officeDocument/2006/relationships" xmlns:p="http://schemas.openxmlformats.org/presentationml/2006/main" show="0">
   <p:cSld>
     <p:spTree>
       <p:nvGrpSpPr>
@@ -9296,8 +10007,8 @@
 </p:sld>
 </file>
 
-<file path=ppt/slides/slide6.xml><?xml version="1.0" encoding="utf-8"?>
-<p:sld xmlns:a="http://schemas.openxmlformats.org/drawingml/2006/main" xmlns:r="http://schemas.openxmlformats.org/officeDocument/2006/relationships" xmlns:p="http://schemas.openxmlformats.org/presentationml/2006/main">
+<file path=ppt/slides/slide7.xml><?xml version="1.0" encoding="utf-8"?>
+<p:sld xmlns:a="http://schemas.openxmlformats.org/drawingml/2006/main" xmlns:r="http://schemas.openxmlformats.org/officeDocument/2006/relationships" xmlns:p="http://schemas.openxmlformats.org/presentationml/2006/main" show="0">
   <p:cSld>
     <p:spTree>
       <p:nvGrpSpPr>
@@ -9406,7 +10117,7 @@
 </p:sld>
 </file>
 
-<file path=ppt/slides/slide7.xml><?xml version="1.0" encoding="utf-8"?>
+<file path=ppt/slides/slide8.xml><?xml version="1.0" encoding="utf-8"?>
 <p:sld xmlns:a="http://schemas.openxmlformats.org/drawingml/2006/main" xmlns:r="http://schemas.openxmlformats.org/officeDocument/2006/relationships" xmlns:p="http://schemas.openxmlformats.org/presentationml/2006/main">
   <p:cSld>
     <p:spTree>
@@ -9553,7 +10264,7 @@
 </p:sld>
 </file>
 
-<file path=ppt/slides/slide8.xml><?xml version="1.0" encoding="utf-8"?>
+<file path=ppt/slides/slide9.xml><?xml version="1.0" encoding="utf-8"?>
 <p:sld xmlns:a="http://schemas.openxmlformats.org/drawingml/2006/main" xmlns:r="http://schemas.openxmlformats.org/officeDocument/2006/relationships" xmlns:p="http://schemas.openxmlformats.org/presentationml/2006/main">
   <p:cSld>
     <p:spTree>
@@ -9701,486 +10412,6 @@
   <p:clrMapOvr>
     <a:masterClrMapping/>
   </p:clrMapOvr>
-</p:sld>
-</file>
-
-<file path=ppt/slides/slide9.xml><?xml version="1.0" encoding="utf-8"?>
-<p:sld xmlns:a="http://schemas.openxmlformats.org/drawingml/2006/main" xmlns:r="http://schemas.openxmlformats.org/officeDocument/2006/relationships" xmlns:p="http://schemas.openxmlformats.org/presentationml/2006/main" showMasterPhAnim="0">
-  <p:cSld>
-    <p:spTree>
-      <p:nvGrpSpPr>
-        <p:cNvPr id="1" name=""/>
-        <p:cNvGrpSpPr/>
-        <p:nvPr/>
-      </p:nvGrpSpPr>
-      <p:grpSpPr>
-        <a:xfrm>
-          <a:off x="0" y="0"/>
-          <a:ext cx="0" cy="0"/>
-          <a:chOff x="0" y="0"/>
-          <a:chExt cx="0" cy="0"/>
-        </a:xfrm>
-      </p:grpSpPr>
-      <p:sp>
-        <p:nvSpPr>
-          <p:cNvPr id="80898" name="Rectangle 2"/>
-          <p:cNvSpPr>
-            <a:spLocks noGrp="1" noChangeArrowheads="1"/>
-          </p:cNvSpPr>
-          <p:nvPr>
-            <p:ph type="title"/>
-          </p:nvPr>
-        </p:nvSpPr>
-        <p:spPr>
-          <a:xfrm>
-            <a:off x="2471739" y="1"/>
-            <a:ext cx="5737225" cy="930275"/>
-          </a:xfrm>
-        </p:spPr>
-        <p:txBody>
-          <a:bodyPr/>
-          <a:lstStyle/>
-          <a:p>
-            <a:r>
-              <a:rPr lang="en-US" sz="4000" dirty="0"/>
-              <a:t>How Engines work 2</a:t>
-            </a:r>
-          </a:p>
-        </p:txBody>
-      </p:sp>
-      <p:sp>
-        <p:nvSpPr>
-          <p:cNvPr id="80899" name="Rectangle 3"/>
-          <p:cNvSpPr>
-            <a:spLocks noGrp="1" noChangeArrowheads="1"/>
-          </p:cNvSpPr>
-          <p:nvPr>
-            <p:ph type="body" idx="1"/>
-          </p:nvPr>
-        </p:nvSpPr>
-        <p:spPr>
-          <a:xfrm>
-            <a:off x="1524000" y="914400"/>
-            <a:ext cx="8909050" cy="5410200"/>
-          </a:xfrm>
-        </p:spPr>
-        <p:txBody>
-          <a:bodyPr/>
-          <a:lstStyle/>
-          <a:p>
-            <a:pPr>
-              <a:lnSpc>
-                <a:spcPct val="90000"/>
-              </a:lnSpc>
-            </a:pPr>
-            <a:r>
-              <a:rPr lang="en-US" sz="2800" dirty="0"/>
-              <a:t>The three arguments passed  to an engine are:</a:t>
-            </a:r>
-          </a:p>
-          <a:p>
-            <a:pPr>
-              <a:lnSpc>
-                <a:spcPct val="90000"/>
-              </a:lnSpc>
-            </a:pPr>
-            <a:r>
-              <a:rPr lang="en-US" sz="2800" dirty="0">
-                <a:solidFill>
-                  <a:srgbClr val="FF0000"/>
-                </a:solidFill>
-              </a:rPr>
-              <a:t>ticks:</a:t>
-            </a:r>
-            <a:r>
-              <a:rPr lang="en-US" sz="2800" dirty="0"/>
-              <a:t>   a positive integer specifying the amount of "fuel" given to the engine.</a:t>
-            </a:r>
-          </a:p>
-          <a:p>
-            <a:pPr>
-              <a:lnSpc>
-                <a:spcPct val="90000"/>
-              </a:lnSpc>
-            </a:pPr>
-            <a:r>
-              <a:rPr lang="en-US" sz="2800" dirty="0">
-                <a:solidFill>
-                  <a:srgbClr val="FF0000"/>
-                </a:solidFill>
-              </a:rPr>
-              <a:t>complete:</a:t>
-            </a:r>
-            <a:r>
-              <a:rPr lang="en-US" sz="2800" dirty="0"/>
-              <a:t>  a procedure that specifies what to do if the evaluation of </a:t>
-            </a:r>
-            <a:r>
-              <a:rPr lang="en-US" sz="2800" dirty="0">
-                <a:latin typeface="Courier New" pitchFamily="49" charset="0"/>
-              </a:rPr>
-              <a:t>thunk</a:t>
-            </a:r>
-            <a:r>
-              <a:rPr lang="en-US" sz="2800" dirty="0"/>
-              <a:t> finishes before the fuel expires.  </a:t>
-            </a:r>
-          </a:p>
-          <a:p>
-            <a:pPr lvl="1">
-              <a:lnSpc>
-                <a:spcPct val="90000"/>
-              </a:lnSpc>
-            </a:pPr>
-            <a:r>
-              <a:rPr lang="en-US" dirty="0">
-                <a:latin typeface="Courier New" pitchFamily="49" charset="0"/>
-              </a:rPr>
-              <a:t>complete</a:t>
-            </a:r>
-            <a:r>
-              <a:rPr lang="en-US" dirty="0"/>
-              <a:t> is a procedure of two arguments: amount of fuel "left over" and the result of the computation.</a:t>
-            </a:r>
-          </a:p>
-          <a:p>
-            <a:pPr>
-              <a:lnSpc>
-                <a:spcPct val="90000"/>
-              </a:lnSpc>
-            </a:pPr>
-            <a:r>
-              <a:rPr lang="en-US" sz="2800" dirty="0">
-                <a:solidFill>
-                  <a:srgbClr val="FF0000"/>
-                </a:solidFill>
-              </a:rPr>
-              <a:t>expire:</a:t>
-            </a:r>
-            <a:r>
-              <a:rPr lang="en-US" sz="2800" dirty="0"/>
-              <a:t>  a one-argument procedure to be executed if the computation runs out of fuel before it completes.  </a:t>
-            </a:r>
-          </a:p>
-          <a:p>
-            <a:pPr lvl="1">
-              <a:lnSpc>
-                <a:spcPct val="90000"/>
-              </a:lnSpc>
-            </a:pPr>
-            <a:r>
-              <a:rPr lang="en-US" dirty="0"/>
-              <a:t>The argument that will be passed to </a:t>
-            </a:r>
-            <a:r>
-              <a:rPr lang="en-US" dirty="0">
-                <a:latin typeface="Courier New" pitchFamily="49" charset="0"/>
-              </a:rPr>
-              <a:t>expire</a:t>
-            </a:r>
-            <a:r>
-              <a:rPr lang="en-US" dirty="0"/>
-              <a:t> is a new engine that can finish the computation from where it left off.</a:t>
-            </a:r>
-          </a:p>
-        </p:txBody>
-      </p:sp>
-    </p:spTree>
-  </p:cSld>
-  <p:clrMapOvr>
-    <a:masterClrMapping/>
-  </p:clrMapOvr>
-  <p:timing>
-    <p:tnLst>
-      <p:par>
-        <p:cTn id="1" dur="indefinite" restart="never" nodeType="tmRoot">
-          <p:childTnLst>
-            <p:seq concurrent="1" nextAc="seek">
-              <p:cTn id="2" dur="indefinite" nodeType="mainSeq">
-                <p:childTnLst>
-                  <p:par>
-                    <p:cTn id="3" fill="hold">
-                      <p:stCondLst>
-                        <p:cond delay="indefinite"/>
-                      </p:stCondLst>
-                      <p:childTnLst>
-                        <p:par>
-                          <p:cTn id="4" fill="hold">
-                            <p:stCondLst>
-                              <p:cond delay="0"/>
-                            </p:stCondLst>
-                            <p:childTnLst>
-                              <p:par>
-                                <p:cTn id="5" presetID="1" presetClass="entr" presetSubtype="0" fill="hold" grpId="0" nodeType="clickEffect">
-                                  <p:stCondLst>
-                                    <p:cond delay="0"/>
-                                  </p:stCondLst>
-                                  <p:childTnLst>
-                                    <p:set>
-                                      <p:cBhvr>
-                                        <p:cTn id="6" dur="1" fill="hold">
-                                          <p:stCondLst>
-                                            <p:cond delay="0"/>
-                                          </p:stCondLst>
-                                        </p:cTn>
-                                        <p:tgtEl>
-                                          <p:spTgt spid="80899">
-                                            <p:txEl>
-                                              <p:pRg st="0" end="0"/>
-                                            </p:txEl>
-                                          </p:spTgt>
-                                        </p:tgtEl>
-                                        <p:attrNameLst>
-                                          <p:attrName>style.visibility</p:attrName>
-                                        </p:attrNameLst>
-                                      </p:cBhvr>
-                                      <p:to>
-                                        <p:strVal val="visible"/>
-                                      </p:to>
-                                    </p:set>
-                                  </p:childTnLst>
-                                </p:cTn>
-                              </p:par>
-                            </p:childTnLst>
-                          </p:cTn>
-                        </p:par>
-                      </p:childTnLst>
-                    </p:cTn>
-                  </p:par>
-                  <p:par>
-                    <p:cTn id="7" fill="hold">
-                      <p:stCondLst>
-                        <p:cond delay="indefinite"/>
-                      </p:stCondLst>
-                      <p:childTnLst>
-                        <p:par>
-                          <p:cTn id="8" fill="hold">
-                            <p:stCondLst>
-                              <p:cond delay="0"/>
-                            </p:stCondLst>
-                            <p:childTnLst>
-                              <p:par>
-                                <p:cTn id="9" presetID="1" presetClass="entr" presetSubtype="0" fill="hold" grpId="0" nodeType="clickEffect">
-                                  <p:stCondLst>
-                                    <p:cond delay="0"/>
-                                  </p:stCondLst>
-                                  <p:childTnLst>
-                                    <p:set>
-                                      <p:cBhvr>
-                                        <p:cTn id="10" dur="1" fill="hold">
-                                          <p:stCondLst>
-                                            <p:cond delay="0"/>
-                                          </p:stCondLst>
-                                        </p:cTn>
-                                        <p:tgtEl>
-                                          <p:spTgt spid="80899">
-                                            <p:txEl>
-                                              <p:pRg st="1" end="1"/>
-                                            </p:txEl>
-                                          </p:spTgt>
-                                        </p:tgtEl>
-                                        <p:attrNameLst>
-                                          <p:attrName>style.visibility</p:attrName>
-                                        </p:attrNameLst>
-                                      </p:cBhvr>
-                                      <p:to>
-                                        <p:strVal val="visible"/>
-                                      </p:to>
-                                    </p:set>
-                                  </p:childTnLst>
-                                </p:cTn>
-                              </p:par>
-                            </p:childTnLst>
-                          </p:cTn>
-                        </p:par>
-                      </p:childTnLst>
-                    </p:cTn>
-                  </p:par>
-                  <p:par>
-                    <p:cTn id="11" fill="hold">
-                      <p:stCondLst>
-                        <p:cond delay="indefinite"/>
-                      </p:stCondLst>
-                      <p:childTnLst>
-                        <p:par>
-                          <p:cTn id="12" fill="hold">
-                            <p:stCondLst>
-                              <p:cond delay="0"/>
-                            </p:stCondLst>
-                            <p:childTnLst>
-                              <p:par>
-                                <p:cTn id="13" presetID="1" presetClass="entr" presetSubtype="0" fill="hold" grpId="0" nodeType="clickEffect">
-                                  <p:stCondLst>
-                                    <p:cond delay="0"/>
-                                  </p:stCondLst>
-                                  <p:childTnLst>
-                                    <p:set>
-                                      <p:cBhvr>
-                                        <p:cTn id="14" dur="1" fill="hold">
-                                          <p:stCondLst>
-                                            <p:cond delay="0"/>
-                                          </p:stCondLst>
-                                        </p:cTn>
-                                        <p:tgtEl>
-                                          <p:spTgt spid="80899">
-                                            <p:txEl>
-                                              <p:pRg st="2" end="2"/>
-                                            </p:txEl>
-                                          </p:spTgt>
-                                        </p:tgtEl>
-                                        <p:attrNameLst>
-                                          <p:attrName>style.visibility</p:attrName>
-                                        </p:attrNameLst>
-                                      </p:cBhvr>
-                                      <p:to>
-                                        <p:strVal val="visible"/>
-                                      </p:to>
-                                    </p:set>
-                                  </p:childTnLst>
-                                </p:cTn>
-                              </p:par>
-                              <p:par>
-                                <p:cTn id="15" presetID="1" presetClass="entr" presetSubtype="0" fill="hold" grpId="0" nodeType="withEffect">
-                                  <p:stCondLst>
-                                    <p:cond delay="0"/>
-                                  </p:stCondLst>
-                                  <p:childTnLst>
-                                    <p:set>
-                                      <p:cBhvr>
-                                        <p:cTn id="16" dur="1" fill="hold">
-                                          <p:stCondLst>
-                                            <p:cond delay="0"/>
-                                          </p:stCondLst>
-                                        </p:cTn>
-                                        <p:tgtEl>
-                                          <p:spTgt spid="80899">
-                                            <p:txEl>
-                                              <p:pRg st="3" end="3"/>
-                                            </p:txEl>
-                                          </p:spTgt>
-                                        </p:tgtEl>
-                                        <p:attrNameLst>
-                                          <p:attrName>style.visibility</p:attrName>
-                                        </p:attrNameLst>
-                                      </p:cBhvr>
-                                      <p:to>
-                                        <p:strVal val="visible"/>
-                                      </p:to>
-                                    </p:set>
-                                  </p:childTnLst>
-                                </p:cTn>
-                              </p:par>
-                            </p:childTnLst>
-                          </p:cTn>
-                        </p:par>
-                      </p:childTnLst>
-                    </p:cTn>
-                  </p:par>
-                  <p:par>
-                    <p:cTn id="17" fill="hold">
-                      <p:stCondLst>
-                        <p:cond delay="indefinite"/>
-                      </p:stCondLst>
-                      <p:childTnLst>
-                        <p:par>
-                          <p:cTn id="18" fill="hold">
-                            <p:stCondLst>
-                              <p:cond delay="0"/>
-                            </p:stCondLst>
-                            <p:childTnLst>
-                              <p:par>
-                                <p:cTn id="19" presetID="1" presetClass="entr" presetSubtype="0" fill="hold" grpId="0" nodeType="clickEffect">
-                                  <p:stCondLst>
-                                    <p:cond delay="0"/>
-                                  </p:stCondLst>
-                                  <p:childTnLst>
-                                    <p:set>
-                                      <p:cBhvr>
-                                        <p:cTn id="20" dur="1" fill="hold">
-                                          <p:stCondLst>
-                                            <p:cond delay="0"/>
-                                          </p:stCondLst>
-                                        </p:cTn>
-                                        <p:tgtEl>
-                                          <p:spTgt spid="80899">
-                                            <p:txEl>
-                                              <p:pRg st="4" end="4"/>
-                                            </p:txEl>
-                                          </p:spTgt>
-                                        </p:tgtEl>
-                                        <p:attrNameLst>
-                                          <p:attrName>style.visibility</p:attrName>
-                                        </p:attrNameLst>
-                                      </p:cBhvr>
-                                      <p:to>
-                                        <p:strVal val="visible"/>
-                                      </p:to>
-                                    </p:set>
-                                  </p:childTnLst>
-                                </p:cTn>
-                              </p:par>
-                              <p:par>
-                                <p:cTn id="21" presetID="1" presetClass="entr" presetSubtype="0" fill="hold" grpId="0" nodeType="withEffect">
-                                  <p:stCondLst>
-                                    <p:cond delay="0"/>
-                                  </p:stCondLst>
-                                  <p:childTnLst>
-                                    <p:set>
-                                      <p:cBhvr>
-                                        <p:cTn id="22" dur="1" fill="hold">
-                                          <p:stCondLst>
-                                            <p:cond delay="0"/>
-                                          </p:stCondLst>
-                                        </p:cTn>
-                                        <p:tgtEl>
-                                          <p:spTgt spid="80899">
-                                            <p:txEl>
-                                              <p:pRg st="5" end="5"/>
-                                            </p:txEl>
-                                          </p:spTgt>
-                                        </p:tgtEl>
-                                        <p:attrNameLst>
-                                          <p:attrName>style.visibility</p:attrName>
-                                        </p:attrNameLst>
-                                      </p:cBhvr>
-                                      <p:to>
-                                        <p:strVal val="visible"/>
-                                      </p:to>
-                                    </p:set>
-                                  </p:childTnLst>
-                                </p:cTn>
-                              </p:par>
-                            </p:childTnLst>
-                          </p:cTn>
-                        </p:par>
-                      </p:childTnLst>
-                    </p:cTn>
-                  </p:par>
-                </p:childTnLst>
-              </p:cTn>
-              <p:prevCondLst>
-                <p:cond evt="onPrev" delay="0">
-                  <p:tgtEl>
-                    <p:sldTgt/>
-                  </p:tgtEl>
-                </p:cond>
-              </p:prevCondLst>
-              <p:nextCondLst>
-                <p:cond evt="onNext" delay="0">
-                  <p:tgtEl>
-                    <p:sldTgt/>
-                  </p:tgtEl>
-                </p:cond>
-              </p:nextCondLst>
-            </p:seq>
-          </p:childTnLst>
-        </p:cTn>
-      </p:par>
-    </p:tnLst>
-    <p:bldLst>
-      <p:bldP spid="80899" grpId="0" build="p"/>
-    </p:bldLst>
-  </p:timing>
 </p:sld>
 </file>
 

</xml_diff>

<commit_message>
release sample exam, remove problem from A19
</commit_message>
<xml_diff>
--- a/ClassMaterials/Engines/35_Final_Engines.pptx
+++ b/ClassMaterials/Engines/35_Final_Engines.pptx
@@ -260,6 +260,30 @@
         </pc:spChg>
         <pc:spChg chg="mod">
           <ac:chgData name="Hewner, Mike" userId="7f3f83dd-6dfb-4127-a87f-c1714bd4fac9" providerId="ADAL" clId="{14FC7E2B-0F04-4A10-B901-1DBC3B72BF4A}" dt="2021-11-05T14:47:55.656" v="4"/>
+          <ac:spMkLst>
+            <pc:docMk/>
+            <pc:sldMk cId="1355269295" sldId="459"/>
+            <ac:spMk id="3" creationId="{576371E3-F8F5-49C0-B187-07C29BCA2BA3}"/>
+          </ac:spMkLst>
+        </pc:spChg>
+      </pc:sldChg>
+    </pc:docChg>
+  </pc:docChgLst>
+  <pc:docChgLst>
+    <pc:chgData name="Hewner, Mike" userId="7f3f83dd-6dfb-4127-a87f-c1714bd4fac9" providerId="ADAL" clId="{BBA2D8EA-036A-4EF7-8187-05A3C68860D7}"/>
+    <pc:docChg chg="custSel modSld">
+      <pc:chgData name="Hewner, Mike" userId="7f3f83dd-6dfb-4127-a87f-c1714bd4fac9" providerId="ADAL" clId="{BBA2D8EA-036A-4EF7-8187-05A3C68860D7}" dt="2022-02-10T19:16:29.609" v="93" actId="20577"/>
+      <pc:docMkLst>
+        <pc:docMk/>
+      </pc:docMkLst>
+      <pc:sldChg chg="modSp mod">
+        <pc:chgData name="Hewner, Mike" userId="7f3f83dd-6dfb-4127-a87f-c1714bd4fac9" providerId="ADAL" clId="{BBA2D8EA-036A-4EF7-8187-05A3C68860D7}" dt="2022-02-10T19:16:29.609" v="93" actId="20577"/>
+        <pc:sldMkLst>
+          <pc:docMk/>
+          <pc:sldMk cId="1355269295" sldId="459"/>
+        </pc:sldMkLst>
+        <pc:spChg chg="mod">
+          <ac:chgData name="Hewner, Mike" userId="7f3f83dd-6dfb-4127-a87f-c1714bd4fac9" providerId="ADAL" clId="{BBA2D8EA-036A-4EF7-8187-05A3C68860D7}" dt="2022-02-10T19:16:29.609" v="93" actId="20577"/>
           <ac:spMkLst>
             <pc:docMk/>
             <pc:sldMk cId="1355269295" sldId="459"/>
@@ -9244,16 +9268,16 @@
               <a:buNone/>
             </a:pPr>
             <a:r>
-              <a:rPr lang="en-US" dirty="0"/>
+              <a:rPr lang="en-US" sz="2800" dirty="0"/>
               <a:t>(run-</a:t>
             </a:r>
             <a:r>
-              <a:rPr lang="en-US" dirty="0" err="1"/>
+              <a:rPr lang="en-US" sz="2800" dirty="0" err="1"/>
               <a:t>pausable</a:t>
             </a:r>
             <a:r>
-              <a:rPr lang="en-US" dirty="0"/>
-              <a:t> (lambda (pause-me)</a:t>
+              <a:rPr lang="en-US" sz="2800" dirty="0"/>
+              <a:t> (lambda ()</a:t>
             </a:r>
           </a:p>
           <a:p>
@@ -9261,8 +9285,8 @@
               <a:buNone/>
             </a:pPr>
             <a:r>
-              <a:rPr lang="en-US" dirty="0"/>
-              <a:t>                (display "1")</a:t>
+              <a:rPr lang="en-US" sz="2800" dirty="0"/>
+              <a:t>                (display 1)</a:t>
             </a:r>
           </a:p>
           <a:p>
@@ -9270,8 +9294,8 @@
               <a:buNone/>
             </a:pPr>
             <a:r>
-              <a:rPr lang="en-US" dirty="0"/>
-              <a:t>                (newline)</a:t>
+              <a:rPr lang="en-US" sz="2800" dirty="0"/>
+              <a:t>                (pause-me)</a:t>
             </a:r>
           </a:p>
           <a:p>
@@ -9279,8 +9303,8 @@
               <a:buNone/>
             </a:pPr>
             <a:r>
-              <a:rPr lang="en-US" dirty="0"/>
-              <a:t>                (pause-me)</a:t>
+              <a:rPr lang="en-US" sz="2800" dirty="0"/>
+              <a:t>                (display 3)))</a:t>
             </a:r>
           </a:p>
           <a:p>
@@ -9288,8 +9312,8 @@
               <a:buNone/>
             </a:pPr>
             <a:r>
-              <a:rPr lang="en-US" dirty="0"/>
-              <a:t>                (display "2")</a:t>
+              <a:rPr lang="en-US" sz="2800" dirty="0"/>
+              <a:t>(display 2)</a:t>
             </a:r>
           </a:p>
           <a:p>
@@ -9297,8 +9321,8 @@
               <a:buNone/>
             </a:pPr>
             <a:r>
-              <a:rPr lang="en-US" dirty="0"/>
-              <a:t>                (newline)</a:t>
+              <a:rPr lang="en-US" sz="2800" dirty="0"/>
+              <a:t>(resume)</a:t>
             </a:r>
           </a:p>
           <a:p>
@@ -9306,9 +9330,22 @@
               <a:buNone/>
             </a:pPr>
             <a:r>
-              <a:rPr lang="en-US" dirty="0"/>
-              <a:t>                (display "3")))</a:t>
-            </a:r>
+              <a:rPr lang="en-US" sz="2800" dirty="0"/>
+              <a:t>(</a:t>
+            </a:r>
+            <a:r>
+              <a:rPr lang="en-US" sz="2800"/>
+              <a:t>display </a:t>
+            </a:r>
+            <a:r>
+              <a:rPr lang="en-US" sz="2800" dirty="0"/>
+              <a:t>4</a:t>
+            </a:r>
+            <a:r>
+              <a:rPr lang="en-US" sz="2800"/>
+              <a:t>)</a:t>
+            </a:r>
+            <a:endParaRPr lang="en-US" sz="2800" dirty="0"/>
           </a:p>
           <a:p>
             <a:pPr marL="0" indent="0">

</xml_diff>